<commit_message>
refactor(drscratch): enhance GUI layout
</commit_message>
<xml_diff>
--- a/static/drscratch-class/drscratch-class.pptx
+++ b/static/drscratch-class/drscratch-class.pptx
@@ -235,7 +235,7 @@
               <a:rPr lang="zh-TW" altLang="en-US" smtClean="0">
                 <a:latin typeface="+mn-ea"/>
               </a:rPr>
-              <a:t>2021年5月4日</a:t>
+              <a:t>2021年5月30日</a:t>
             </a:fld>
             <a:endParaRPr lang="zh-TW" altLang="en-US" dirty="0">
               <a:latin typeface="+mn-ea"/>
@@ -417,7 +417,7 @@
             <a:fld id="{EA027A95-8984-4ED1-931A-6EE29F557E13}" type="datetime2">
               <a:rPr lang="zh-TW" altLang="en-US" smtClean="0"/>
               <a:pPr/>
-              <a:t>2021年5月4日</a:t>
+              <a:t>2021年5月30日</a:t>
             </a:fld>
             <a:endParaRPr lang="zh-TW" altLang="en-US" dirty="0"/>
           </a:p>
@@ -3775,7 +3775,7 @@
           <a:p>
             <a:fld id="{25A8C0B6-D2AE-48F7-866B-48571089C340}" type="datetimeFigureOut">
               <a:rPr lang="zh-TW" altLang="en-US" smtClean="0"/>
-              <a:t>2021/5/4</a:t>
+              <a:t>2021/5/30</a:t>
             </a:fld>
             <a:endParaRPr lang="zh-TW" altLang="en-US"/>
           </a:p>
@@ -3957,7 +3957,7 @@
           <a:p>
             <a:fld id="{6D0B7F2D-1FD9-44A9-9744-68081327F218}" type="datetime2">
               <a:rPr lang="zh-TW" altLang="en-US" smtClean="0"/>
-              <a:t>2021年5月4日</a:t>
+              <a:t>2021年5月30日</a:t>
             </a:fld>
             <a:endParaRPr lang="zh-TW" altLang="en-US" dirty="0"/>
           </a:p>
@@ -4155,7 +4155,7 @@
           <a:p>
             <a:fld id="{4C21D3AD-41A3-4022-8D3B-DE1AEBFB3F17}" type="datetime2">
               <a:rPr lang="zh-TW" altLang="en-US" smtClean="0"/>
-              <a:t>2021年5月4日</a:t>
+              <a:t>2021年5月30日</a:t>
             </a:fld>
             <a:endParaRPr lang="zh-TW" altLang="en-US" dirty="0"/>
           </a:p>
@@ -6182,7 +6182,7 @@
           <a:p>
             <a:fld id="{14BA12EA-8DC6-4825-9658-D32F8EE2015B}" type="datetime2">
               <a:rPr lang="zh-TW" altLang="en-US" smtClean="0"/>
-              <a:t>2021年5月4日</a:t>
+              <a:t>2021年5月30日</a:t>
             </a:fld>
             <a:endParaRPr lang="zh-TW" altLang="en-US" dirty="0"/>
           </a:p>
@@ -6446,7 +6446,7 @@
           <a:p>
             <a:fld id="{25A8C0B6-D2AE-48F7-866B-48571089C340}" type="datetimeFigureOut">
               <a:rPr lang="zh-TW" altLang="en-US" smtClean="0"/>
-              <a:t>2021/5/4</a:t>
+              <a:t>2021/5/30</a:t>
             </a:fld>
             <a:endParaRPr lang="zh-TW" altLang="en-US"/>
           </a:p>
@@ -6690,7 +6690,7 @@
           <a:p>
             <a:fld id="{255AAD2A-885D-4498-BB35-2E7CB2DF80A8}" type="datetime2">
               <a:rPr lang="zh-TW" altLang="en-US" smtClean="0"/>
-              <a:t>2021年5月4日</a:t>
+              <a:t>2021年5月30日</a:t>
             </a:fld>
             <a:endParaRPr lang="zh-TW" altLang="en-US" dirty="0"/>
           </a:p>
@@ -7063,7 +7063,7 @@
           <a:p>
             <a:fld id="{0E26F778-CACD-4B9D-A71C-7A5B0B22A0AE}" type="datetime2">
               <a:rPr lang="zh-TW" altLang="en-US" smtClean="0"/>
-              <a:t>2021年5月4日</a:t>
+              <a:t>2021年5月30日</a:t>
             </a:fld>
             <a:endParaRPr lang="zh-TW" altLang="en-US" dirty="0"/>
           </a:p>
@@ -7199,7 +7199,7 @@
           <a:p>
             <a:fld id="{4901DE57-BD53-4843-8E46-71B266F68225}" type="datetime2">
               <a:rPr lang="zh-TW" altLang="en-US" smtClean="0"/>
-              <a:t>2021年5月4日</a:t>
+              <a:t>2021年5月30日</a:t>
             </a:fld>
             <a:endParaRPr lang="zh-TW" altLang="en-US" dirty="0"/>
           </a:p>
@@ -7312,7 +7312,7 @@
           <a:p>
             <a:fld id="{F390D8E3-4BE8-4531-A5D6-31C16F2F9BBE}" type="datetime2">
               <a:rPr lang="zh-TW" altLang="en-US" smtClean="0"/>
-              <a:t>2021年5月4日</a:t>
+              <a:t>2021年5月30日</a:t>
             </a:fld>
             <a:endParaRPr lang="zh-TW" altLang="en-US" dirty="0"/>
           </a:p>
@@ -7607,7 +7607,7 @@
           <a:p>
             <a:fld id="{255AAD2A-885D-4498-BB35-2E7CB2DF80A8}" type="datetime2">
               <a:rPr lang="zh-TW" altLang="en-US" smtClean="0"/>
-              <a:t>2021年5月4日</a:t>
+              <a:t>2021年5月30日</a:t>
             </a:fld>
             <a:endParaRPr lang="zh-TW" altLang="en-US" dirty="0"/>
           </a:p>
@@ -7870,7 +7870,7 @@
           <a:p>
             <a:fld id="{255AAD2A-885D-4498-BB35-2E7CB2DF80A8}" type="datetime2">
               <a:rPr lang="zh-TW" altLang="en-US" smtClean="0"/>
-              <a:t>2021年5月4日</a:t>
+              <a:t>2021年5月30日</a:t>
             </a:fld>
             <a:endParaRPr lang="zh-TW" altLang="en-US" dirty="0"/>
           </a:p>
@@ -8089,7 +8089,7 @@
           <a:p>
             <a:fld id="{255AAD2A-885D-4498-BB35-2E7CB2DF80A8}" type="datetime2">
               <a:rPr lang="zh-TW" altLang="en-US" smtClean="0"/>
-              <a:t>2021年5月4日</a:t>
+              <a:t>2021年5月30日</a:t>
             </a:fld>
             <a:endParaRPr lang="zh-TW" altLang="en-US" dirty="0"/>
           </a:p>
@@ -10069,8 +10069,8 @@
         </p:nvSpPr>
         <p:spPr>
           <a:xfrm>
-            <a:off x="3719737" y="6093295"/>
-            <a:ext cx="1008112" cy="764703"/>
+            <a:off x="2639617" y="6093295"/>
+            <a:ext cx="936104" cy="764703"/>
           </a:xfrm>
           <a:prstGeom prst="roundRect">
             <a:avLst/>
@@ -15443,7 +15443,7 @@
         <p:spPr>
           <a:xfrm>
             <a:off x="9624392" y="1288524"/>
-            <a:ext cx="2016224" cy="1200329"/>
+            <a:ext cx="2016224" cy="461665"/>
           </a:xfrm>
           <a:prstGeom prst="rect">
             <a:avLst/>
@@ -15454,40 +15454,6 @@
             <a:spAutoFit/>
           </a:bodyPr>
           <a:lstStyle/>
-          <a:p>
-            <a:pPr marL="285750" indent="-285750">
-              <a:buFontTx/>
-              <a:buChar char="-"/>
-            </a:pPr>
-            <a:r>
-              <a:rPr lang="zh-TW" altLang="en-US" sz="2400" dirty="0">
-                <a:latin typeface="標楷體" panose="03000509000000000000" pitchFamily="65" charset="-120"/>
-                <a:ea typeface="標楷體" panose="03000509000000000000" pitchFamily="65" charset="-120"/>
-              </a:rPr>
-              <a:t>兩個綠旗</a:t>
-            </a:r>
-            <a:endParaRPr lang="en-US" altLang="zh-TW" sz="2400" dirty="0">
-              <a:latin typeface="標楷體" panose="03000509000000000000" pitchFamily="65" charset="-120"/>
-              <a:ea typeface="標楷體" panose="03000509000000000000" pitchFamily="65" charset="-120"/>
-            </a:endParaRPr>
-          </a:p>
-          <a:p>
-            <a:pPr marL="285750" indent="-285750">
-              <a:buFontTx/>
-              <a:buChar char="-"/>
-            </a:pPr>
-            <a:r>
-              <a:rPr lang="zh-TW" altLang="en-US" sz="2400" dirty="0">
-                <a:latin typeface="標楷體" panose="03000509000000000000" pitchFamily="65" charset="-120"/>
-                <a:ea typeface="標楷體" panose="03000509000000000000" pitchFamily="65" charset="-120"/>
-              </a:rPr>
-              <a:t>函式積木</a:t>
-            </a:r>
-            <a:endParaRPr lang="en-US" altLang="zh-TW" sz="2400" dirty="0">
-              <a:latin typeface="標楷體" panose="03000509000000000000" pitchFamily="65" charset="-120"/>
-              <a:ea typeface="標楷體" panose="03000509000000000000" pitchFamily="65" charset="-120"/>
-            </a:endParaRPr>
-          </a:p>
           <a:p>
             <a:pPr marL="285750" indent="-285750">
               <a:buFontTx/>
@@ -16603,16 +16569,14 @@
       </p:grpSpPr>
       <p:pic>
         <p:nvPicPr>
-          <p:cNvPr id="12" name="圖片 11">
+          <p:cNvPr id="13" name="圖片 12">
             <a:extLst>
               <a:ext uri="{FF2B5EF4-FFF2-40B4-BE49-F238E27FC236}">
-                <a16:creationId xmlns:a16="http://schemas.microsoft.com/office/drawing/2014/main" id="{D00A97C8-60AB-409D-97AE-048003CE48ED}"/>
+                <a16:creationId xmlns:a16="http://schemas.microsoft.com/office/drawing/2014/main" id="{C1C19B0C-BCF6-4590-90A7-965DBAC68A0F}"/>
               </a:ext>
             </a:extLst>
           </p:cNvPr>
-          <p:cNvPicPr>
-            <a:picLocks noChangeAspect="1"/>
-          </p:cNvPicPr>
+          <p:cNvPicPr/>
           <p:nvPr/>
         </p:nvPicPr>
         <p:blipFill>
@@ -16623,8 +16587,8 @@
         </p:blipFill>
         <p:spPr>
           <a:xfrm>
-            <a:off x="191344" y="709559"/>
-            <a:ext cx="10005261" cy="6172348"/>
+            <a:off x="840612" y="1536825"/>
+            <a:ext cx="7703660" cy="5184650"/>
           </a:xfrm>
           <a:prstGeom prst="rect">
             <a:avLst/>
@@ -16735,110 +16699,6 @@
       </p:sp>
       <p:sp>
         <p:nvSpPr>
-          <p:cNvPr id="7" name="矩形: 圓角 6">
-            <a:extLst>
-              <a:ext uri="{FF2B5EF4-FFF2-40B4-BE49-F238E27FC236}">
-                <a16:creationId xmlns:a16="http://schemas.microsoft.com/office/drawing/2014/main" id="{DF8C0488-DAEA-49B6-B97C-068BC0788B83}"/>
-              </a:ext>
-            </a:extLst>
-          </p:cNvPr>
-          <p:cNvSpPr/>
-          <p:nvPr/>
-        </p:nvSpPr>
-        <p:spPr>
-          <a:xfrm flipV="1">
-            <a:off x="191344" y="1988840"/>
-            <a:ext cx="2143508" cy="1152128"/>
-          </a:xfrm>
-          <a:prstGeom prst="roundRect">
-            <a:avLst/>
-          </a:prstGeom>
-          <a:noFill/>
-          <a:ln w="28575">
-            <a:solidFill>
-              <a:srgbClr val="FF0000"/>
-            </a:solidFill>
-          </a:ln>
-        </p:spPr>
-        <p:style>
-          <a:lnRef idx="2">
-            <a:schemeClr val="accent1">
-              <a:shade val="50000"/>
-            </a:schemeClr>
-          </a:lnRef>
-          <a:fillRef idx="1">
-            <a:schemeClr val="accent1"/>
-          </a:fillRef>
-          <a:effectRef idx="0">
-            <a:schemeClr val="accent1"/>
-          </a:effectRef>
-          <a:fontRef idx="minor">
-            <a:schemeClr val="lt1"/>
-          </a:fontRef>
-        </p:style>
-        <p:txBody>
-          <a:bodyPr rtlCol="0" anchor="ctr"/>
-          <a:lstStyle/>
-          <a:p>
-            <a:pPr algn="ctr"/>
-            <a:endParaRPr lang="zh-TW" altLang="en-US"/>
-          </a:p>
-        </p:txBody>
-      </p:sp>
-      <p:sp>
-        <p:nvSpPr>
-          <p:cNvPr id="14" name="矩形: 圓角 13">
-            <a:extLst>
-              <a:ext uri="{FF2B5EF4-FFF2-40B4-BE49-F238E27FC236}">
-                <a16:creationId xmlns:a16="http://schemas.microsoft.com/office/drawing/2014/main" id="{199596AB-BEC2-49D0-BBD6-4A061CF5203E}"/>
-              </a:ext>
-            </a:extLst>
-          </p:cNvPr>
-          <p:cNvSpPr/>
-          <p:nvPr/>
-        </p:nvSpPr>
-        <p:spPr>
-          <a:xfrm flipV="1">
-            <a:off x="2639616" y="1988840"/>
-            <a:ext cx="2304256" cy="1152128"/>
-          </a:xfrm>
-          <a:prstGeom prst="roundRect">
-            <a:avLst/>
-          </a:prstGeom>
-          <a:noFill/>
-          <a:ln w="28575">
-            <a:solidFill>
-              <a:srgbClr val="FF0000"/>
-            </a:solidFill>
-          </a:ln>
-        </p:spPr>
-        <p:style>
-          <a:lnRef idx="2">
-            <a:schemeClr val="accent1">
-              <a:shade val="50000"/>
-            </a:schemeClr>
-          </a:lnRef>
-          <a:fillRef idx="1">
-            <a:schemeClr val="accent1"/>
-          </a:fillRef>
-          <a:effectRef idx="0">
-            <a:schemeClr val="accent1"/>
-          </a:effectRef>
-          <a:fontRef idx="minor">
-            <a:schemeClr val="lt1"/>
-          </a:fontRef>
-        </p:style>
-        <p:txBody>
-          <a:bodyPr rtlCol="0" anchor="ctr"/>
-          <a:lstStyle/>
-          <a:p>
-            <a:pPr algn="ctr"/>
-            <a:endParaRPr lang="zh-TW" altLang="en-US"/>
-          </a:p>
-        </p:txBody>
-      </p:sp>
-      <p:sp>
-        <p:nvSpPr>
           <p:cNvPr id="16" name="矩形: 圓角 15">
             <a:extLst>
               <a:ext uri="{FF2B5EF4-FFF2-40B4-BE49-F238E27FC236}">
@@ -16851,60 +16711,8 @@
         </p:nvSpPr>
         <p:spPr>
           <a:xfrm flipV="1">
-            <a:off x="2567608" y="4439441"/>
-            <a:ext cx="2304256" cy="1005780"/>
-          </a:xfrm>
-          <a:prstGeom prst="roundRect">
-            <a:avLst/>
-          </a:prstGeom>
-          <a:noFill/>
-          <a:ln w="28575">
-            <a:solidFill>
-              <a:srgbClr val="FF0000"/>
-            </a:solidFill>
-          </a:ln>
-        </p:spPr>
-        <p:style>
-          <a:lnRef idx="2">
-            <a:schemeClr val="accent1">
-              <a:shade val="50000"/>
-            </a:schemeClr>
-          </a:lnRef>
-          <a:fillRef idx="1">
-            <a:schemeClr val="accent1"/>
-          </a:fillRef>
-          <a:effectRef idx="0">
-            <a:schemeClr val="accent1"/>
-          </a:effectRef>
-          <a:fontRef idx="minor">
-            <a:schemeClr val="lt1"/>
-          </a:fontRef>
-        </p:style>
-        <p:txBody>
-          <a:bodyPr rtlCol="0" anchor="ctr"/>
-          <a:lstStyle/>
-          <a:p>
-            <a:pPr algn="ctr"/>
-            <a:endParaRPr lang="zh-TW" altLang="en-US"/>
-          </a:p>
-        </p:txBody>
-      </p:sp>
-      <p:sp>
-        <p:nvSpPr>
-          <p:cNvPr id="17" name="矩形: 圓角 16">
-            <a:extLst>
-              <a:ext uri="{FF2B5EF4-FFF2-40B4-BE49-F238E27FC236}">
-                <a16:creationId xmlns:a16="http://schemas.microsoft.com/office/drawing/2014/main" id="{AAB1DDDB-FCE1-412D-9EA5-F1F8E8CE6480}"/>
-              </a:ext>
-            </a:extLst>
-          </p:cNvPr>
-          <p:cNvSpPr/>
-          <p:nvPr/>
-        </p:nvSpPr>
-        <p:spPr>
-          <a:xfrm flipV="1">
-            <a:off x="263352" y="4439440"/>
-            <a:ext cx="2049581" cy="1005781"/>
+            <a:off x="2063552" y="5445220"/>
+            <a:ext cx="2304256" cy="360044"/>
           </a:xfrm>
           <a:prstGeom prst="roundRect">
             <a:avLst/>
@@ -16956,7 +16764,7 @@
           <p:nvPr>
             <p:extLst>
               <p:ext uri="{D42A27DB-BD31-4B8C-83A1-F6EECF244321}">
-                <p14:modId xmlns:p14="http://schemas.microsoft.com/office/powerpoint/2010/main" val="623918486"/>
+                <p14:modId xmlns:p14="http://schemas.microsoft.com/office/powerpoint/2010/main" val="321389310"/>
               </p:ext>
             </p:extLst>
           </p:nvPr>
@@ -17236,7 +17044,7 @@
                       <a:r>
                         <a:rPr lang="en-US" altLang="zh-TW" sz="2000" dirty="0">
                           <a:solidFill>
-                            <a:srgbClr val="FF0000"/>
+                            <a:schemeClr val="tx1"/>
                           </a:solidFill>
                           <a:latin typeface="標楷體" panose="03000509000000000000" pitchFamily="65" charset="-120"/>
                           <a:ea typeface="標楷體" panose="03000509000000000000" pitchFamily="65" charset="-120"/>
@@ -17245,7 +17053,7 @@
                       </a:r>
                       <a:endParaRPr lang="zh-TW" altLang="en-US" sz="2000" dirty="0">
                         <a:solidFill>
-                          <a:srgbClr val="FF0000"/>
+                          <a:schemeClr val="tx1"/>
                         </a:solidFill>
                         <a:latin typeface="標楷體" panose="03000509000000000000" pitchFamily="65" charset="-120"/>
                         <a:ea typeface="標楷體" panose="03000509000000000000" pitchFamily="65" charset="-120"/>
@@ -17396,7 +17204,7 @@
                       <a:r>
                         <a:rPr lang="en-US" altLang="zh-TW" sz="2000" dirty="0">
                           <a:solidFill>
-                            <a:schemeClr val="tx1"/>
+                            <a:srgbClr val="FF0000"/>
                           </a:solidFill>
                           <a:latin typeface="標楷體" panose="03000509000000000000" pitchFamily="65" charset="-120"/>
                           <a:ea typeface="標楷體" panose="03000509000000000000" pitchFamily="65" charset="-120"/>
@@ -17405,7 +17213,7 @@
                       </a:r>
                       <a:endParaRPr lang="zh-TW" altLang="en-US" sz="2000" dirty="0">
                         <a:solidFill>
-                          <a:schemeClr val="tx1"/>
+                          <a:srgbClr val="FF0000"/>
                         </a:solidFill>
                         <a:latin typeface="標楷體" panose="03000509000000000000" pitchFamily="65" charset="-120"/>
                         <a:ea typeface="標楷體" panose="03000509000000000000" pitchFamily="65" charset="-120"/>
@@ -17729,8 +17537,8 @@
         </p:nvSpPr>
         <p:spPr>
           <a:xfrm>
-            <a:off x="10272464" y="1196752"/>
-            <a:ext cx="1728192" cy="1200329"/>
+            <a:off x="9624392" y="1196752"/>
+            <a:ext cx="2376264" cy="461665"/>
           </a:xfrm>
           <a:prstGeom prst="rect">
             <a:avLst/>
@@ -17751,29 +17559,168 @@
                 <a:latin typeface="標楷體" panose="03000509000000000000" pitchFamily="65" charset="-120"/>
                 <a:ea typeface="標楷體" panose="03000509000000000000" pitchFamily="65" charset="-120"/>
               </a:rPr>
-              <a:t>兩個綠旗</a:t>
+              <a:t>如果按鍵按下</a:t>
             </a:r>
             <a:endParaRPr lang="en-US" altLang="zh-TW" sz="2400" dirty="0">
               <a:latin typeface="標楷體" panose="03000509000000000000" pitchFamily="65" charset="-120"/>
               <a:ea typeface="標楷體" panose="03000509000000000000" pitchFamily="65" charset="-120"/>
             </a:endParaRPr>
           </a:p>
+        </p:txBody>
+      </p:sp>
+      <p:sp>
+        <p:nvSpPr>
+          <p:cNvPr id="15" name="矩形: 圓角 14">
+            <a:extLst>
+              <a:ext uri="{FF2B5EF4-FFF2-40B4-BE49-F238E27FC236}">
+                <a16:creationId xmlns:a16="http://schemas.microsoft.com/office/drawing/2014/main" id="{DF5A87E1-87BC-4ED4-8DD8-486450DCE666}"/>
+              </a:ext>
+            </a:extLst>
+          </p:cNvPr>
+          <p:cNvSpPr/>
+          <p:nvPr/>
+        </p:nvSpPr>
+        <p:spPr>
+          <a:xfrm flipV="1">
+            <a:off x="2063552" y="3501008"/>
+            <a:ext cx="2087329" cy="360044"/>
+          </a:xfrm>
+          <a:prstGeom prst="roundRect">
+            <a:avLst/>
+          </a:prstGeom>
+          <a:noFill/>
+          <a:ln w="28575">
+            <a:solidFill>
+              <a:srgbClr val="FF0000"/>
+            </a:solidFill>
+          </a:ln>
+        </p:spPr>
+        <p:style>
+          <a:lnRef idx="2">
+            <a:schemeClr val="accent1">
+              <a:shade val="50000"/>
+            </a:schemeClr>
+          </a:lnRef>
+          <a:fillRef idx="1">
+            <a:schemeClr val="accent1"/>
+          </a:fillRef>
+          <a:effectRef idx="0">
+            <a:schemeClr val="accent1"/>
+          </a:effectRef>
+          <a:fontRef idx="minor">
+            <a:schemeClr val="lt1"/>
+          </a:fontRef>
+        </p:style>
+        <p:txBody>
+          <a:bodyPr rtlCol="0" anchor="ctr"/>
+          <a:lstStyle/>
           <a:p>
-            <a:pPr marL="285750" indent="-285750">
-              <a:buFontTx/>
-              <a:buChar char="-"/>
-            </a:pPr>
-            <a:r>
-              <a:rPr lang="zh-TW" altLang="en-US" sz="2400" dirty="0">
-                <a:latin typeface="標楷體" panose="03000509000000000000" pitchFamily="65" charset="-120"/>
-                <a:ea typeface="標楷體" panose="03000509000000000000" pitchFamily="65" charset="-120"/>
-              </a:rPr>
-              <a:t>如果按鍵按下</a:t>
-            </a:r>
-            <a:endParaRPr lang="en-US" altLang="zh-TW" sz="2400" dirty="0">
-              <a:latin typeface="標楷體" panose="03000509000000000000" pitchFamily="65" charset="-120"/>
-              <a:ea typeface="標楷體" panose="03000509000000000000" pitchFamily="65" charset="-120"/>
-            </a:endParaRPr>
+            <a:pPr algn="ctr"/>
+            <a:endParaRPr lang="zh-TW" altLang="en-US"/>
+          </a:p>
+        </p:txBody>
+      </p:sp>
+      <p:sp>
+        <p:nvSpPr>
+          <p:cNvPr id="18" name="矩形: 圓角 17">
+            <a:extLst>
+              <a:ext uri="{FF2B5EF4-FFF2-40B4-BE49-F238E27FC236}">
+                <a16:creationId xmlns:a16="http://schemas.microsoft.com/office/drawing/2014/main" id="{155C68E8-20FD-43A7-9652-D3D3A4C8C473}"/>
+              </a:ext>
+            </a:extLst>
+          </p:cNvPr>
+          <p:cNvSpPr/>
+          <p:nvPr/>
+        </p:nvSpPr>
+        <p:spPr>
+          <a:xfrm flipV="1">
+            <a:off x="2063552" y="4589504"/>
+            <a:ext cx="2456656" cy="360045"/>
+          </a:xfrm>
+          <a:prstGeom prst="roundRect">
+            <a:avLst/>
+          </a:prstGeom>
+          <a:noFill/>
+          <a:ln w="28575">
+            <a:solidFill>
+              <a:srgbClr val="FF0000"/>
+            </a:solidFill>
+          </a:ln>
+        </p:spPr>
+        <p:style>
+          <a:lnRef idx="2">
+            <a:schemeClr val="accent1">
+              <a:shade val="50000"/>
+            </a:schemeClr>
+          </a:lnRef>
+          <a:fillRef idx="1">
+            <a:schemeClr val="accent1"/>
+          </a:fillRef>
+          <a:effectRef idx="0">
+            <a:schemeClr val="accent1"/>
+          </a:effectRef>
+          <a:fontRef idx="minor">
+            <a:schemeClr val="lt1"/>
+          </a:fontRef>
+        </p:style>
+        <p:txBody>
+          <a:bodyPr rtlCol="0" anchor="ctr"/>
+          <a:lstStyle/>
+          <a:p>
+            <a:pPr algn="ctr"/>
+            <a:endParaRPr lang="zh-TW" altLang="en-US"/>
+          </a:p>
+        </p:txBody>
+      </p:sp>
+      <p:sp>
+        <p:nvSpPr>
+          <p:cNvPr id="19" name="矩形: 圓角 18">
+            <a:extLst>
+              <a:ext uri="{FF2B5EF4-FFF2-40B4-BE49-F238E27FC236}">
+                <a16:creationId xmlns:a16="http://schemas.microsoft.com/office/drawing/2014/main" id="{ABC4E266-2328-4DC0-895E-E4A892436AB7}"/>
+              </a:ext>
+            </a:extLst>
+          </p:cNvPr>
+          <p:cNvSpPr/>
+          <p:nvPr/>
+        </p:nvSpPr>
+        <p:spPr>
+          <a:xfrm flipV="1">
+            <a:off x="2063552" y="2584796"/>
+            <a:ext cx="2304256" cy="268139"/>
+          </a:xfrm>
+          <a:prstGeom prst="roundRect">
+            <a:avLst/>
+          </a:prstGeom>
+          <a:noFill/>
+          <a:ln w="28575">
+            <a:solidFill>
+              <a:srgbClr val="FF0000"/>
+            </a:solidFill>
+          </a:ln>
+        </p:spPr>
+        <p:style>
+          <a:lnRef idx="2">
+            <a:schemeClr val="accent1">
+              <a:shade val="50000"/>
+            </a:schemeClr>
+          </a:lnRef>
+          <a:fillRef idx="1">
+            <a:schemeClr val="accent1"/>
+          </a:fillRef>
+          <a:effectRef idx="0">
+            <a:schemeClr val="accent1"/>
+          </a:effectRef>
+          <a:fontRef idx="minor">
+            <a:schemeClr val="lt1"/>
+          </a:fontRef>
+        </p:style>
+        <p:txBody>
+          <a:bodyPr rtlCol="0" anchor="ctr"/>
+          <a:lstStyle/>
+          <a:p>
+            <a:pPr algn="ctr"/>
+            <a:endParaRPr lang="zh-TW" altLang="en-US"/>
           </a:p>
         </p:txBody>
       </p:sp>
@@ -34773,15 +34720,6 @@
 </file>
 
 <file path=customXml/item1.xml><?xml version="1.0" encoding="utf-8"?>
-<?mso-contentType ?>
-<FormTemplates xmlns="http://schemas.microsoft.com/sharepoint/v3/contenttype/forms">
-  <Display>DocumentLibraryForm</Display>
-  <Edit>DocumentLibraryForm</Edit>
-  <New>DocumentLibraryForm</New>
-</FormTemplates>
-</file>
-
-<file path=customXml/item2.xml><?xml version="1.0" encoding="utf-8"?>
 <p:properties xmlns:p="http://schemas.microsoft.com/office/2006/metadata/properties" xmlns:xsi="http://www.w3.org/2001/XMLSchema-instance" xmlns:pc="http://schemas.microsoft.com/office/infopath/2007/PartnerControls">
   <documentManagement>
     <VSO_x0020_item_x0020_id xmlns="40262f94-9f35-4ac3-9a90-690165a166b7" xsi:nil="true"/>
@@ -34790,6 +34728,15 @@
     <Template_x0020_details xmlns="40262f94-9f35-4ac3-9a90-690165a166b7" xsi:nil="true"/>
   </documentManagement>
 </p:properties>
+</file>
+
+<file path=customXml/item2.xml><?xml version="1.0" encoding="utf-8"?>
+<?mso-contentType ?>
+<FormTemplates xmlns="http://schemas.microsoft.com/sharepoint/v3/contenttype/forms">
+  <Display>DocumentLibraryForm</Display>
+  <Edit>DocumentLibraryForm</Edit>
+  <New>DocumentLibraryForm</New>
+</FormTemplates>
 </file>
 
 <file path=customXml/item3.xml><?xml version="1.0" encoding="utf-8"?>
@@ -34974,14 +34921,6 @@
 </file>
 
 <file path=customXml/itemProps1.xml><?xml version="1.0" encoding="utf-8"?>
-<ds:datastoreItem xmlns:ds="http://schemas.openxmlformats.org/officeDocument/2006/customXml" ds:itemID="{9EDF6667-B669-49A4-BBE6-2132BA71C0C7}">
-  <ds:schemaRefs>
-    <ds:schemaRef ds:uri="http://schemas.microsoft.com/sharepoint/v3/contenttype/forms"/>
-  </ds:schemaRefs>
-</ds:datastoreItem>
-</file>
-
-<file path=customXml/itemProps2.xml><?xml version="1.0" encoding="utf-8"?>
 <ds:datastoreItem xmlns:ds="http://schemas.openxmlformats.org/officeDocument/2006/customXml" ds:itemID="{1DA15C6C-6BB6-4DB6-B7D6-7F14EAB2CC5C}">
   <ds:schemaRefs>
     <ds:schemaRef ds:uri="http://purl.org/dc/elements/1.1/"/>
@@ -34994,6 +34933,14 @@
     <ds:schemaRef ds:uri="40262f94-9f35-4ac3-9a90-690165a166b7"/>
     <ds:schemaRef ds:uri="http://www.w3.org/XML/1998/namespace"/>
     <ds:schemaRef ds:uri="http://purl.org/dc/dcmitype/"/>
+  </ds:schemaRefs>
+</ds:datastoreItem>
+</file>
+
+<file path=customXml/itemProps2.xml><?xml version="1.0" encoding="utf-8"?>
+<ds:datastoreItem xmlns:ds="http://schemas.openxmlformats.org/officeDocument/2006/customXml" ds:itemID="{9EDF6667-B669-49A4-BBE6-2132BA71C0C7}">
+  <ds:schemaRefs>
+    <ds:schemaRef ds:uri="http://schemas.microsoft.com/sharepoint/v3/contenttype/forms"/>
   </ds:schemaRefs>
 </ds:datastoreItem>
 </file>

</xml_diff>

<commit_message>
refactor(drscratch): update drscratch courses
</commit_message>
<xml_diff>
--- a/static/drscratch-class/drscratch-class.pptx
+++ b/static/drscratch-class/drscratch-class.pptx
@@ -235,7 +235,7 @@
               <a:rPr lang="zh-TW" altLang="en-US" smtClean="0">
                 <a:latin typeface="+mn-ea"/>
               </a:rPr>
-              <a:t>2021年5月30日</a:t>
+              <a:t>2021年6月20日</a:t>
             </a:fld>
             <a:endParaRPr lang="zh-TW" altLang="en-US" dirty="0">
               <a:latin typeface="+mn-ea"/>
@@ -417,7 +417,7 @@
             <a:fld id="{EA027A95-8984-4ED1-931A-6EE29F557E13}" type="datetime2">
               <a:rPr lang="zh-TW" altLang="en-US" smtClean="0"/>
               <a:pPr/>
-              <a:t>2021年5月30日</a:t>
+              <a:t>2021年6月20日</a:t>
             </a:fld>
             <a:endParaRPr lang="zh-TW" altLang="en-US" dirty="0"/>
           </a:p>
@@ -3775,7 +3775,7 @@
           <a:p>
             <a:fld id="{25A8C0B6-D2AE-48F7-866B-48571089C340}" type="datetimeFigureOut">
               <a:rPr lang="zh-TW" altLang="en-US" smtClean="0"/>
-              <a:t>2021/5/30</a:t>
+              <a:t>2021/6/20</a:t>
             </a:fld>
             <a:endParaRPr lang="zh-TW" altLang="en-US"/>
           </a:p>
@@ -3957,7 +3957,7 @@
           <a:p>
             <a:fld id="{6D0B7F2D-1FD9-44A9-9744-68081327F218}" type="datetime2">
               <a:rPr lang="zh-TW" altLang="en-US" smtClean="0"/>
-              <a:t>2021年5月30日</a:t>
+              <a:t>2021年6月20日</a:t>
             </a:fld>
             <a:endParaRPr lang="zh-TW" altLang="en-US" dirty="0"/>
           </a:p>
@@ -4155,7 +4155,7 @@
           <a:p>
             <a:fld id="{4C21D3AD-41A3-4022-8D3B-DE1AEBFB3F17}" type="datetime2">
               <a:rPr lang="zh-TW" altLang="en-US" smtClean="0"/>
-              <a:t>2021年5月30日</a:t>
+              <a:t>2021年6月20日</a:t>
             </a:fld>
             <a:endParaRPr lang="zh-TW" altLang="en-US" dirty="0"/>
           </a:p>
@@ -6182,7 +6182,7 @@
           <a:p>
             <a:fld id="{14BA12EA-8DC6-4825-9658-D32F8EE2015B}" type="datetime2">
               <a:rPr lang="zh-TW" altLang="en-US" smtClean="0"/>
-              <a:t>2021年5月30日</a:t>
+              <a:t>2021年6月20日</a:t>
             </a:fld>
             <a:endParaRPr lang="zh-TW" altLang="en-US" dirty="0"/>
           </a:p>
@@ -6446,7 +6446,7 @@
           <a:p>
             <a:fld id="{25A8C0B6-D2AE-48F7-866B-48571089C340}" type="datetimeFigureOut">
               <a:rPr lang="zh-TW" altLang="en-US" smtClean="0"/>
-              <a:t>2021/5/30</a:t>
+              <a:t>2021/6/20</a:t>
             </a:fld>
             <a:endParaRPr lang="zh-TW" altLang="en-US"/>
           </a:p>
@@ -6690,7 +6690,7 @@
           <a:p>
             <a:fld id="{255AAD2A-885D-4498-BB35-2E7CB2DF80A8}" type="datetime2">
               <a:rPr lang="zh-TW" altLang="en-US" smtClean="0"/>
-              <a:t>2021年5月30日</a:t>
+              <a:t>2021年6月20日</a:t>
             </a:fld>
             <a:endParaRPr lang="zh-TW" altLang="en-US" dirty="0"/>
           </a:p>
@@ -7063,7 +7063,7 @@
           <a:p>
             <a:fld id="{0E26F778-CACD-4B9D-A71C-7A5B0B22A0AE}" type="datetime2">
               <a:rPr lang="zh-TW" altLang="en-US" smtClean="0"/>
-              <a:t>2021年5月30日</a:t>
+              <a:t>2021年6月20日</a:t>
             </a:fld>
             <a:endParaRPr lang="zh-TW" altLang="en-US" dirty="0"/>
           </a:p>
@@ -7199,7 +7199,7 @@
           <a:p>
             <a:fld id="{4901DE57-BD53-4843-8E46-71B266F68225}" type="datetime2">
               <a:rPr lang="zh-TW" altLang="en-US" smtClean="0"/>
-              <a:t>2021年5月30日</a:t>
+              <a:t>2021年6月20日</a:t>
             </a:fld>
             <a:endParaRPr lang="zh-TW" altLang="en-US" dirty="0"/>
           </a:p>
@@ -7312,7 +7312,7 @@
           <a:p>
             <a:fld id="{F390D8E3-4BE8-4531-A5D6-31C16F2F9BBE}" type="datetime2">
               <a:rPr lang="zh-TW" altLang="en-US" smtClean="0"/>
-              <a:t>2021年5月30日</a:t>
+              <a:t>2021年6月20日</a:t>
             </a:fld>
             <a:endParaRPr lang="zh-TW" altLang="en-US" dirty="0"/>
           </a:p>
@@ -7607,7 +7607,7 @@
           <a:p>
             <a:fld id="{255AAD2A-885D-4498-BB35-2E7CB2DF80A8}" type="datetime2">
               <a:rPr lang="zh-TW" altLang="en-US" smtClean="0"/>
-              <a:t>2021年5月30日</a:t>
+              <a:t>2021年6月20日</a:t>
             </a:fld>
             <a:endParaRPr lang="zh-TW" altLang="en-US" dirty="0"/>
           </a:p>
@@ -7870,7 +7870,7 @@
           <a:p>
             <a:fld id="{255AAD2A-885D-4498-BB35-2E7CB2DF80A8}" type="datetime2">
               <a:rPr lang="zh-TW" altLang="en-US" smtClean="0"/>
-              <a:t>2021年5月30日</a:t>
+              <a:t>2021年6月20日</a:t>
             </a:fld>
             <a:endParaRPr lang="zh-TW" altLang="en-US" dirty="0"/>
           </a:p>
@@ -8089,7 +8089,7 @@
           <a:p>
             <a:fld id="{255AAD2A-885D-4498-BB35-2E7CB2DF80A8}" type="datetime2">
               <a:rPr lang="zh-TW" altLang="en-US" smtClean="0"/>
-              <a:t>2021年5月30日</a:t>
+              <a:t>2021年6月20日</a:t>
             </a:fld>
             <a:endParaRPr lang="zh-TW" altLang="en-US" dirty="0"/>
           </a:p>
@@ -10069,8 +10069,8 @@
         </p:nvSpPr>
         <p:spPr>
           <a:xfrm>
-            <a:off x="2639617" y="6093295"/>
-            <a:ext cx="936104" cy="764703"/>
+            <a:off x="3719737" y="6093295"/>
+            <a:ext cx="1008112" cy="764703"/>
           </a:xfrm>
           <a:prstGeom prst="roundRect">
             <a:avLst/>
@@ -15443,7 +15443,7 @@
         <p:spPr>
           <a:xfrm>
             <a:off x="9624392" y="1288524"/>
-            <a:ext cx="2016224" cy="461665"/>
+            <a:ext cx="2016224" cy="1200329"/>
           </a:xfrm>
           <a:prstGeom prst="rect">
             <a:avLst/>
@@ -15454,6 +15454,40 @@
             <a:spAutoFit/>
           </a:bodyPr>
           <a:lstStyle/>
+          <a:p>
+            <a:pPr marL="285750" indent="-285750">
+              <a:buFontTx/>
+              <a:buChar char="-"/>
+            </a:pPr>
+            <a:r>
+              <a:rPr lang="zh-TW" altLang="en-US" sz="2400" dirty="0">
+                <a:latin typeface="標楷體" panose="03000509000000000000" pitchFamily="65" charset="-120"/>
+                <a:ea typeface="標楷體" panose="03000509000000000000" pitchFamily="65" charset="-120"/>
+              </a:rPr>
+              <a:t>兩個綠旗</a:t>
+            </a:r>
+            <a:endParaRPr lang="en-US" altLang="zh-TW" sz="2400" dirty="0">
+              <a:latin typeface="標楷體" panose="03000509000000000000" pitchFamily="65" charset="-120"/>
+              <a:ea typeface="標楷體" panose="03000509000000000000" pitchFamily="65" charset="-120"/>
+            </a:endParaRPr>
+          </a:p>
+          <a:p>
+            <a:pPr marL="285750" indent="-285750">
+              <a:buFontTx/>
+              <a:buChar char="-"/>
+            </a:pPr>
+            <a:r>
+              <a:rPr lang="zh-TW" altLang="en-US" sz="2400" dirty="0">
+                <a:latin typeface="標楷體" panose="03000509000000000000" pitchFamily="65" charset="-120"/>
+                <a:ea typeface="標楷體" panose="03000509000000000000" pitchFamily="65" charset="-120"/>
+              </a:rPr>
+              <a:t>函式積木</a:t>
+            </a:r>
+            <a:endParaRPr lang="en-US" altLang="zh-TW" sz="2400" dirty="0">
+              <a:latin typeface="標楷體" panose="03000509000000000000" pitchFamily="65" charset="-120"/>
+              <a:ea typeface="標楷體" panose="03000509000000000000" pitchFamily="65" charset="-120"/>
+            </a:endParaRPr>
+          </a:p>
           <a:p>
             <a:pPr marL="285750" indent="-285750">
               <a:buFontTx/>
@@ -16569,14 +16603,16 @@
       </p:grpSpPr>
       <p:pic>
         <p:nvPicPr>
-          <p:cNvPr id="13" name="圖片 12">
+          <p:cNvPr id="5" name="圖片 4">
             <a:extLst>
               <a:ext uri="{FF2B5EF4-FFF2-40B4-BE49-F238E27FC236}">
-                <a16:creationId xmlns:a16="http://schemas.microsoft.com/office/drawing/2014/main" id="{C1C19B0C-BCF6-4590-90A7-965DBAC68A0F}"/>
+                <a16:creationId xmlns:a16="http://schemas.microsoft.com/office/drawing/2014/main" id="{26EEBEBD-F3B7-4750-9BFE-0962ED38AA2B}"/>
               </a:ext>
             </a:extLst>
           </p:cNvPr>
-          <p:cNvPicPr/>
+          <p:cNvPicPr>
+            <a:picLocks noChangeAspect="1"/>
+          </p:cNvPicPr>
           <p:nvPr/>
         </p:nvPicPr>
         <p:blipFill>
@@ -16587,8 +16623,8 @@
         </p:blipFill>
         <p:spPr>
           <a:xfrm>
-            <a:off x="840612" y="1536825"/>
-            <a:ext cx="7703660" cy="5184650"/>
+            <a:off x="523321" y="466607"/>
+            <a:ext cx="9353550" cy="6296025"/>
           </a:xfrm>
           <a:prstGeom prst="rect">
             <a:avLst/>
@@ -16699,6 +16735,110 @@
       </p:sp>
       <p:sp>
         <p:nvSpPr>
+          <p:cNvPr id="7" name="矩形: 圓角 6">
+            <a:extLst>
+              <a:ext uri="{FF2B5EF4-FFF2-40B4-BE49-F238E27FC236}">
+                <a16:creationId xmlns:a16="http://schemas.microsoft.com/office/drawing/2014/main" id="{DF8C0488-DAEA-49B6-B97C-068BC0788B83}"/>
+              </a:ext>
+            </a:extLst>
+          </p:cNvPr>
+          <p:cNvSpPr/>
+          <p:nvPr/>
+        </p:nvSpPr>
+        <p:spPr>
+          <a:xfrm flipV="1">
+            <a:off x="2315129" y="1196752"/>
+            <a:ext cx="2268703" cy="1254534"/>
+          </a:xfrm>
+          <a:prstGeom prst="roundRect">
+            <a:avLst/>
+          </a:prstGeom>
+          <a:noFill/>
+          <a:ln w="28575">
+            <a:solidFill>
+              <a:srgbClr val="FF0000"/>
+            </a:solidFill>
+          </a:ln>
+        </p:spPr>
+        <p:style>
+          <a:lnRef idx="2">
+            <a:schemeClr val="accent1">
+              <a:shade val="50000"/>
+            </a:schemeClr>
+          </a:lnRef>
+          <a:fillRef idx="1">
+            <a:schemeClr val="accent1"/>
+          </a:fillRef>
+          <a:effectRef idx="0">
+            <a:schemeClr val="accent1"/>
+          </a:effectRef>
+          <a:fontRef idx="minor">
+            <a:schemeClr val="lt1"/>
+          </a:fontRef>
+        </p:style>
+        <p:txBody>
+          <a:bodyPr rtlCol="0" anchor="ctr"/>
+          <a:lstStyle/>
+          <a:p>
+            <a:pPr algn="ctr"/>
+            <a:endParaRPr lang="zh-TW" altLang="en-US"/>
+          </a:p>
+        </p:txBody>
+      </p:sp>
+      <p:sp>
+        <p:nvSpPr>
+          <p:cNvPr id="14" name="矩形: 圓角 13">
+            <a:extLst>
+              <a:ext uri="{FF2B5EF4-FFF2-40B4-BE49-F238E27FC236}">
+                <a16:creationId xmlns:a16="http://schemas.microsoft.com/office/drawing/2014/main" id="{199596AB-BEC2-49D0-BBD6-4A061CF5203E}"/>
+              </a:ext>
+            </a:extLst>
+          </p:cNvPr>
+          <p:cNvSpPr/>
+          <p:nvPr/>
+        </p:nvSpPr>
+        <p:spPr>
+          <a:xfrm flipV="1">
+            <a:off x="2315130" y="2600849"/>
+            <a:ext cx="2376264" cy="1002565"/>
+          </a:xfrm>
+          <a:prstGeom prst="roundRect">
+            <a:avLst/>
+          </a:prstGeom>
+          <a:noFill/>
+          <a:ln w="28575">
+            <a:solidFill>
+              <a:srgbClr val="FF0000"/>
+            </a:solidFill>
+          </a:ln>
+        </p:spPr>
+        <p:style>
+          <a:lnRef idx="2">
+            <a:schemeClr val="accent1">
+              <a:shade val="50000"/>
+            </a:schemeClr>
+          </a:lnRef>
+          <a:fillRef idx="1">
+            <a:schemeClr val="accent1"/>
+          </a:fillRef>
+          <a:effectRef idx="0">
+            <a:schemeClr val="accent1"/>
+          </a:effectRef>
+          <a:fontRef idx="minor">
+            <a:schemeClr val="lt1"/>
+          </a:fontRef>
+        </p:style>
+        <p:txBody>
+          <a:bodyPr rtlCol="0" anchor="ctr"/>
+          <a:lstStyle/>
+          <a:p>
+            <a:pPr algn="ctr"/>
+            <a:endParaRPr lang="zh-TW" altLang="en-US"/>
+          </a:p>
+        </p:txBody>
+      </p:sp>
+      <p:sp>
+        <p:nvSpPr>
           <p:cNvPr id="16" name="矩形: 圓角 15">
             <a:extLst>
               <a:ext uri="{FF2B5EF4-FFF2-40B4-BE49-F238E27FC236}">
@@ -16711,8 +16851,60 @@
         </p:nvSpPr>
         <p:spPr>
           <a:xfrm flipV="1">
-            <a:off x="2063552" y="5445220"/>
-            <a:ext cx="2304256" cy="360044"/>
+            <a:off x="2315129" y="5126789"/>
+            <a:ext cx="2376265" cy="1110517"/>
+          </a:xfrm>
+          <a:prstGeom prst="roundRect">
+            <a:avLst/>
+          </a:prstGeom>
+          <a:noFill/>
+          <a:ln w="28575">
+            <a:solidFill>
+              <a:srgbClr val="FF0000"/>
+            </a:solidFill>
+          </a:ln>
+        </p:spPr>
+        <p:style>
+          <a:lnRef idx="2">
+            <a:schemeClr val="accent1">
+              <a:shade val="50000"/>
+            </a:schemeClr>
+          </a:lnRef>
+          <a:fillRef idx="1">
+            <a:schemeClr val="accent1"/>
+          </a:fillRef>
+          <a:effectRef idx="0">
+            <a:schemeClr val="accent1"/>
+          </a:effectRef>
+          <a:fontRef idx="minor">
+            <a:schemeClr val="lt1"/>
+          </a:fontRef>
+        </p:style>
+        <p:txBody>
+          <a:bodyPr rtlCol="0" anchor="ctr"/>
+          <a:lstStyle/>
+          <a:p>
+            <a:pPr algn="ctr"/>
+            <a:endParaRPr lang="zh-TW" altLang="en-US"/>
+          </a:p>
+        </p:txBody>
+      </p:sp>
+      <p:sp>
+        <p:nvSpPr>
+          <p:cNvPr id="17" name="矩形: 圓角 16">
+            <a:extLst>
+              <a:ext uri="{FF2B5EF4-FFF2-40B4-BE49-F238E27FC236}">
+                <a16:creationId xmlns:a16="http://schemas.microsoft.com/office/drawing/2014/main" id="{AAB1DDDB-FCE1-412D-9EA5-F1F8E8CE6480}"/>
+              </a:ext>
+            </a:extLst>
+          </p:cNvPr>
+          <p:cNvSpPr/>
+          <p:nvPr/>
+        </p:nvSpPr>
+        <p:spPr>
+          <a:xfrm flipV="1">
+            <a:off x="2315129" y="3974659"/>
+            <a:ext cx="2376265" cy="966507"/>
           </a:xfrm>
           <a:prstGeom prst="roundRect">
             <a:avLst/>
@@ -16764,7 +16956,7 @@
           <p:nvPr>
             <p:extLst>
               <p:ext uri="{D42A27DB-BD31-4B8C-83A1-F6EECF244321}">
-                <p14:modId xmlns:p14="http://schemas.microsoft.com/office/powerpoint/2010/main" val="321389310"/>
+                <p14:modId xmlns:p14="http://schemas.microsoft.com/office/powerpoint/2010/main" val="623918486"/>
               </p:ext>
             </p:extLst>
           </p:nvPr>
@@ -17044,7 +17236,7 @@
                       <a:r>
                         <a:rPr lang="en-US" altLang="zh-TW" sz="2000" dirty="0">
                           <a:solidFill>
-                            <a:schemeClr val="tx1"/>
+                            <a:srgbClr val="FF0000"/>
                           </a:solidFill>
                           <a:latin typeface="標楷體" panose="03000509000000000000" pitchFamily="65" charset="-120"/>
                           <a:ea typeface="標楷體" panose="03000509000000000000" pitchFamily="65" charset="-120"/>
@@ -17053,7 +17245,7 @@
                       </a:r>
                       <a:endParaRPr lang="zh-TW" altLang="en-US" sz="2000" dirty="0">
                         <a:solidFill>
-                          <a:schemeClr val="tx1"/>
+                          <a:srgbClr val="FF0000"/>
                         </a:solidFill>
                         <a:latin typeface="標楷體" panose="03000509000000000000" pitchFamily="65" charset="-120"/>
                         <a:ea typeface="標楷體" panose="03000509000000000000" pitchFamily="65" charset="-120"/>
@@ -17204,7 +17396,7 @@
                       <a:r>
                         <a:rPr lang="en-US" altLang="zh-TW" sz="2000" dirty="0">
                           <a:solidFill>
-                            <a:srgbClr val="FF0000"/>
+                            <a:schemeClr val="tx1"/>
                           </a:solidFill>
                           <a:latin typeface="標楷體" panose="03000509000000000000" pitchFamily="65" charset="-120"/>
                           <a:ea typeface="標楷體" panose="03000509000000000000" pitchFamily="65" charset="-120"/>
@@ -17213,7 +17405,7 @@
                       </a:r>
                       <a:endParaRPr lang="zh-TW" altLang="en-US" sz="2000" dirty="0">
                         <a:solidFill>
-                          <a:srgbClr val="FF0000"/>
+                          <a:schemeClr val="tx1"/>
                         </a:solidFill>
                         <a:latin typeface="標楷體" panose="03000509000000000000" pitchFamily="65" charset="-120"/>
                         <a:ea typeface="標楷體" panose="03000509000000000000" pitchFamily="65" charset="-120"/>
@@ -17537,8 +17729,8 @@
         </p:nvSpPr>
         <p:spPr>
           <a:xfrm>
-            <a:off x="9624392" y="1196752"/>
-            <a:ext cx="2376264" cy="461665"/>
+            <a:off x="10272464" y="1196752"/>
+            <a:ext cx="1728192" cy="1200329"/>
           </a:xfrm>
           <a:prstGeom prst="rect">
             <a:avLst/>
@@ -17559,168 +17751,29 @@
                 <a:latin typeface="標楷體" panose="03000509000000000000" pitchFamily="65" charset="-120"/>
                 <a:ea typeface="標楷體" panose="03000509000000000000" pitchFamily="65" charset="-120"/>
               </a:rPr>
-              <a:t>如果按鍵按下</a:t>
+              <a:t>兩個綠旗</a:t>
             </a:r>
             <a:endParaRPr lang="en-US" altLang="zh-TW" sz="2400" dirty="0">
               <a:latin typeface="標楷體" panose="03000509000000000000" pitchFamily="65" charset="-120"/>
               <a:ea typeface="標楷體" panose="03000509000000000000" pitchFamily="65" charset="-120"/>
             </a:endParaRPr>
           </a:p>
-        </p:txBody>
-      </p:sp>
-      <p:sp>
-        <p:nvSpPr>
-          <p:cNvPr id="15" name="矩形: 圓角 14">
-            <a:extLst>
-              <a:ext uri="{FF2B5EF4-FFF2-40B4-BE49-F238E27FC236}">
-                <a16:creationId xmlns:a16="http://schemas.microsoft.com/office/drawing/2014/main" id="{DF5A87E1-87BC-4ED4-8DD8-486450DCE666}"/>
-              </a:ext>
-            </a:extLst>
-          </p:cNvPr>
-          <p:cNvSpPr/>
-          <p:nvPr/>
-        </p:nvSpPr>
-        <p:spPr>
-          <a:xfrm flipV="1">
-            <a:off x="2063552" y="3501008"/>
-            <a:ext cx="2087329" cy="360044"/>
-          </a:xfrm>
-          <a:prstGeom prst="roundRect">
-            <a:avLst/>
-          </a:prstGeom>
-          <a:noFill/>
-          <a:ln w="28575">
-            <a:solidFill>
-              <a:srgbClr val="FF0000"/>
-            </a:solidFill>
-          </a:ln>
-        </p:spPr>
-        <p:style>
-          <a:lnRef idx="2">
-            <a:schemeClr val="accent1">
-              <a:shade val="50000"/>
-            </a:schemeClr>
-          </a:lnRef>
-          <a:fillRef idx="1">
-            <a:schemeClr val="accent1"/>
-          </a:fillRef>
-          <a:effectRef idx="0">
-            <a:schemeClr val="accent1"/>
-          </a:effectRef>
-          <a:fontRef idx="minor">
-            <a:schemeClr val="lt1"/>
-          </a:fontRef>
-        </p:style>
-        <p:txBody>
-          <a:bodyPr rtlCol="0" anchor="ctr"/>
-          <a:lstStyle/>
           <a:p>
-            <a:pPr algn="ctr"/>
-            <a:endParaRPr lang="zh-TW" altLang="en-US"/>
-          </a:p>
-        </p:txBody>
-      </p:sp>
-      <p:sp>
-        <p:nvSpPr>
-          <p:cNvPr id="18" name="矩形: 圓角 17">
-            <a:extLst>
-              <a:ext uri="{FF2B5EF4-FFF2-40B4-BE49-F238E27FC236}">
-                <a16:creationId xmlns:a16="http://schemas.microsoft.com/office/drawing/2014/main" id="{155C68E8-20FD-43A7-9652-D3D3A4C8C473}"/>
-              </a:ext>
-            </a:extLst>
-          </p:cNvPr>
-          <p:cNvSpPr/>
-          <p:nvPr/>
-        </p:nvSpPr>
-        <p:spPr>
-          <a:xfrm flipV="1">
-            <a:off x="2063552" y="4589504"/>
-            <a:ext cx="2456656" cy="360045"/>
-          </a:xfrm>
-          <a:prstGeom prst="roundRect">
-            <a:avLst/>
-          </a:prstGeom>
-          <a:noFill/>
-          <a:ln w="28575">
-            <a:solidFill>
-              <a:srgbClr val="FF0000"/>
-            </a:solidFill>
-          </a:ln>
-        </p:spPr>
-        <p:style>
-          <a:lnRef idx="2">
-            <a:schemeClr val="accent1">
-              <a:shade val="50000"/>
-            </a:schemeClr>
-          </a:lnRef>
-          <a:fillRef idx="1">
-            <a:schemeClr val="accent1"/>
-          </a:fillRef>
-          <a:effectRef idx="0">
-            <a:schemeClr val="accent1"/>
-          </a:effectRef>
-          <a:fontRef idx="minor">
-            <a:schemeClr val="lt1"/>
-          </a:fontRef>
-        </p:style>
-        <p:txBody>
-          <a:bodyPr rtlCol="0" anchor="ctr"/>
-          <a:lstStyle/>
-          <a:p>
-            <a:pPr algn="ctr"/>
-            <a:endParaRPr lang="zh-TW" altLang="en-US"/>
-          </a:p>
-        </p:txBody>
-      </p:sp>
-      <p:sp>
-        <p:nvSpPr>
-          <p:cNvPr id="19" name="矩形: 圓角 18">
-            <a:extLst>
-              <a:ext uri="{FF2B5EF4-FFF2-40B4-BE49-F238E27FC236}">
-                <a16:creationId xmlns:a16="http://schemas.microsoft.com/office/drawing/2014/main" id="{ABC4E266-2328-4DC0-895E-E4A892436AB7}"/>
-              </a:ext>
-            </a:extLst>
-          </p:cNvPr>
-          <p:cNvSpPr/>
-          <p:nvPr/>
-        </p:nvSpPr>
-        <p:spPr>
-          <a:xfrm flipV="1">
-            <a:off x="2063552" y="2584796"/>
-            <a:ext cx="2304256" cy="268139"/>
-          </a:xfrm>
-          <a:prstGeom prst="roundRect">
-            <a:avLst/>
-          </a:prstGeom>
-          <a:noFill/>
-          <a:ln w="28575">
-            <a:solidFill>
-              <a:srgbClr val="FF0000"/>
-            </a:solidFill>
-          </a:ln>
-        </p:spPr>
-        <p:style>
-          <a:lnRef idx="2">
-            <a:schemeClr val="accent1">
-              <a:shade val="50000"/>
-            </a:schemeClr>
-          </a:lnRef>
-          <a:fillRef idx="1">
-            <a:schemeClr val="accent1"/>
-          </a:fillRef>
-          <a:effectRef idx="0">
-            <a:schemeClr val="accent1"/>
-          </a:effectRef>
-          <a:fontRef idx="minor">
-            <a:schemeClr val="lt1"/>
-          </a:fontRef>
-        </p:style>
-        <p:txBody>
-          <a:bodyPr rtlCol="0" anchor="ctr"/>
-          <a:lstStyle/>
-          <a:p>
-            <a:pPr algn="ctr"/>
-            <a:endParaRPr lang="zh-TW" altLang="en-US"/>
+            <a:pPr marL="285750" indent="-285750">
+              <a:buFontTx/>
+              <a:buChar char="-"/>
+            </a:pPr>
+            <a:r>
+              <a:rPr lang="zh-TW" altLang="en-US" sz="2400" dirty="0">
+                <a:latin typeface="標楷體" panose="03000509000000000000" pitchFamily="65" charset="-120"/>
+                <a:ea typeface="標楷體" panose="03000509000000000000" pitchFamily="65" charset="-120"/>
+              </a:rPr>
+              <a:t>如果按鍵按下</a:t>
+            </a:r>
+            <a:endParaRPr lang="en-US" altLang="zh-TW" sz="2400" dirty="0">
+              <a:latin typeface="標楷體" panose="03000509000000000000" pitchFamily="65" charset="-120"/>
+              <a:ea typeface="標楷體" panose="03000509000000000000" pitchFamily="65" charset="-120"/>
+            </a:endParaRPr>
           </a:p>
         </p:txBody>
       </p:sp>
@@ -20277,7 +20330,7 @@
               <a:rPr lang="zh-TW" altLang="en-US" dirty="0">
                 <a:ea typeface="標楷體" panose="03000509000000000000" pitchFamily="65" charset="-120"/>
               </a:rPr>
-              <a:t>遇到問題時，如何拆解與分析問題，並進而解決問題。</a:t>
+              <a:t>在闖關遊戲時，學習如何分析問題，拆解問題。</a:t>
             </a:r>
             <a:endParaRPr lang="en-US" altLang="zh-TW" dirty="0">
               <a:ea typeface="標楷體" panose="03000509000000000000" pitchFamily="65" charset="-120"/>
@@ -20285,10 +20338,16 @@
           </a:p>
           <a:p>
             <a:r>
+              <a:rPr lang="zh-TW" altLang="en-US">
+                <a:ea typeface="標楷體" panose="03000509000000000000" pitchFamily="65" charset="-120"/>
+              </a:rPr>
+              <a:t>學習運用運算思維的向度來解決</a:t>
+            </a:r>
+            <a:r>
               <a:rPr lang="zh-TW" altLang="en-US" dirty="0">
                 <a:ea typeface="標楷體" panose="03000509000000000000" pitchFamily="65" charset="-120"/>
               </a:rPr>
-              <a:t>讓我們學習到運算思維是運用那些方式去分析問題而解決問題。</a:t>
+              <a:t>問題。</a:t>
             </a:r>
             <a:endParaRPr lang="zh-TW" altLang="en-US" dirty="0"/>
           </a:p>
@@ -34720,6 +34779,15 @@
 </file>
 
 <file path=customXml/item1.xml><?xml version="1.0" encoding="utf-8"?>
+<?mso-contentType ?>
+<FormTemplates xmlns="http://schemas.microsoft.com/sharepoint/v3/contenttype/forms">
+  <Display>DocumentLibraryForm</Display>
+  <Edit>DocumentLibraryForm</Edit>
+  <New>DocumentLibraryForm</New>
+</FormTemplates>
+</file>
+
+<file path=customXml/item2.xml><?xml version="1.0" encoding="utf-8"?>
 <p:properties xmlns:p="http://schemas.microsoft.com/office/2006/metadata/properties" xmlns:xsi="http://www.w3.org/2001/XMLSchema-instance" xmlns:pc="http://schemas.microsoft.com/office/infopath/2007/PartnerControls">
   <documentManagement>
     <VSO_x0020_item_x0020_id xmlns="40262f94-9f35-4ac3-9a90-690165a166b7" xsi:nil="true"/>
@@ -34728,15 +34796,6 @@
     <Template_x0020_details xmlns="40262f94-9f35-4ac3-9a90-690165a166b7" xsi:nil="true"/>
   </documentManagement>
 </p:properties>
-</file>
-
-<file path=customXml/item2.xml><?xml version="1.0" encoding="utf-8"?>
-<?mso-contentType ?>
-<FormTemplates xmlns="http://schemas.microsoft.com/sharepoint/v3/contenttype/forms">
-  <Display>DocumentLibraryForm</Display>
-  <Edit>DocumentLibraryForm</Edit>
-  <New>DocumentLibraryForm</New>
-</FormTemplates>
 </file>
 
 <file path=customXml/item3.xml><?xml version="1.0" encoding="utf-8"?>
@@ -34921,6 +34980,14 @@
 </file>
 
 <file path=customXml/itemProps1.xml><?xml version="1.0" encoding="utf-8"?>
+<ds:datastoreItem xmlns:ds="http://schemas.openxmlformats.org/officeDocument/2006/customXml" ds:itemID="{9EDF6667-B669-49A4-BBE6-2132BA71C0C7}">
+  <ds:schemaRefs>
+    <ds:schemaRef ds:uri="http://schemas.microsoft.com/sharepoint/v3/contenttype/forms"/>
+  </ds:schemaRefs>
+</ds:datastoreItem>
+</file>
+
+<file path=customXml/itemProps2.xml><?xml version="1.0" encoding="utf-8"?>
 <ds:datastoreItem xmlns:ds="http://schemas.openxmlformats.org/officeDocument/2006/customXml" ds:itemID="{1DA15C6C-6BB6-4DB6-B7D6-7F14EAB2CC5C}">
   <ds:schemaRefs>
     <ds:schemaRef ds:uri="http://purl.org/dc/elements/1.1/"/>
@@ -34933,14 +35000,6 @@
     <ds:schemaRef ds:uri="40262f94-9f35-4ac3-9a90-690165a166b7"/>
     <ds:schemaRef ds:uri="http://www.w3.org/XML/1998/namespace"/>
     <ds:schemaRef ds:uri="http://purl.org/dc/dcmitype/"/>
-  </ds:schemaRefs>
-</ds:datastoreItem>
-</file>
-
-<file path=customXml/itemProps2.xml><?xml version="1.0" encoding="utf-8"?>
-<ds:datastoreItem xmlns:ds="http://schemas.openxmlformats.org/officeDocument/2006/customXml" ds:itemID="{9EDF6667-B669-49A4-BBE6-2132BA71C0C7}">
-  <ds:schemaRefs>
-    <ds:schemaRef ds:uri="http://schemas.microsoft.com/sharepoint/v3/contenttype/forms"/>
   </ds:schemaRefs>
 </ds:datastoreItem>
 </file>

</xml_diff>